<commit_message>
:bento:(website) update pdf and pptx posters
change URL and email on pdf and pptx files
</commit_message>
<xml_diff>
--- a/public/playground_assets/affiche-bbb-dsi.pptx
+++ b/public/playground_assets/affiche-bbb-dsi.pptx
@@ -1,50 +1,70 @@
 
 <file path=ppt/presentation.xml><?xml version="1.0" encoding="utf-8"?>
-<p:presentation xmlns:a="http://schemas.openxmlformats.org/drawingml/2006/main" xmlns:r="http://schemas.openxmlformats.org/officeDocument/2006/relationships" xmlns:p="http://schemas.openxmlformats.org/presentationml/2006/main" embedTrueTypeFonts="1" saveSubsetFonts="1">
+<p:presentation xmlns:a="http://schemas.openxmlformats.org/drawingml/2006/main" xmlns:r="http://schemas.openxmlformats.org/officeDocument/2006/relationships" xmlns:p="http://schemas.openxmlformats.org/presentationml/2006/main" saveSubsetFonts="1" embedTrueTypeFonts="true">
   <p:sldMasterIdLst>
     <p:sldMasterId id="2147483648" r:id="rId1"/>
   </p:sldMasterIdLst>
   <p:sldIdLst>
-    <p:sldId id="256" r:id="rId2"/>
+    <p:sldId id="256" r:id="rId20"/>
   </p:sldIdLst>
   <p:sldSz cx="32918400" cy="43891200"/>
   <p:notesSz cx="6858000" cy="9144000"/>
   <p:embeddedFontLst>
     <p:embeddedFont>
-      <p:font typeface="Calibri" panose="020F0502020204030204" pitchFamily="34" charset="0"/>
-      <p:regular r:id="rId3"/>
-      <p:bold r:id="rId4"/>
-      <p:italic r:id="rId5"/>
-      <p:boldItalic r:id="rId6"/>
+      <p:font typeface="Arimo" charset="1" panose="020B0604020202020204"/>
+      <p:regular r:id="rId6"/>
     </p:embeddedFont>
     <p:embeddedFont>
-      <p:font typeface="Nourd Bold" panose="020B0604020202020204" charset="0"/>
+      <p:font typeface="Arimo Bold" charset="1" panose="020B0704020202020204"/>
       <p:regular r:id="rId7"/>
     </p:embeddedFont>
     <p:embeddedFont>
-      <p:font typeface="Open Sans" panose="020B0604020202020204" charset="0"/>
+      <p:font typeface="Arimo Italics" charset="1" panose="020B0604020202090204"/>
       <p:regular r:id="rId8"/>
-      <p:bold r:id="rId9"/>
-      <p:italic r:id="rId10"/>
-      <p:boldItalic r:id="rId11"/>
     </p:embeddedFont>
     <p:embeddedFont>
-      <p:font typeface="Open Sans Bold" panose="020B0604020202020204" charset="0"/>
-      <p:regular r:id="rId12"/>
-      <p:bold r:id="rId13"/>
+      <p:font typeface="Arimo Bold Italics" charset="1" panose="020B0704020202090204"/>
+      <p:regular r:id="rId9"/>
     </p:embeddedFont>
     <p:embeddedFont>
-      <p:font typeface="Open Sans Light" panose="020B0604020202020204" charset="0"/>
-      <p:regular r:id="rId14"/>
-      <p:italic r:id="rId15"/>
+      <p:font typeface="Open Sans Light" charset="1" panose="020B0306030504020204"/>
+      <p:regular r:id="rId10"/>
     </p:embeddedFont>
     <p:embeddedFont>
-      <p:font typeface="Open Sans Light Bold" panose="020B0604020202020204" charset="0"/>
+      <p:font typeface="Open Sans Light Bold" charset="1" panose="020B0806030504020204"/>
+      <p:regular r:id="rId11"/>
+    </p:embeddedFont>
+    <p:embeddedFont>
+      <p:font typeface="Open Sans Light Italics" charset="1" panose="020B0306030504020204"/>
+      <p:regular r:id="rId12"/>
+    </p:embeddedFont>
+    <p:embeddedFont>
+      <p:font typeface="Open Sans Light Bold Italics" charset="1" panose="020B0806030504020204"/>
+      <p:regular r:id="rId13"/>
+    </p:embeddedFont>
+    <p:embeddedFont>
+      <p:font typeface="Open Sans" charset="1" panose="020B0606030504020204"/>
+      <p:regular r:id="rId14"/>
+    </p:embeddedFont>
+    <p:embeddedFont>
+      <p:font typeface="Open Sans Bold" charset="1" panose="020B0806030504020204"/>
+      <p:regular r:id="rId15"/>
+    </p:embeddedFont>
+    <p:embeddedFont>
+      <p:font typeface="Open Sans Italics" charset="1" panose="020B0606030504020204"/>
       <p:regular r:id="rId16"/>
     </p:embeddedFont>
     <p:embeddedFont>
-      <p:font typeface="Open Sans Light Italics" panose="020B0604020202020204" charset="0"/>
+      <p:font typeface="Open Sans Bold Italics" charset="1" panose="020B0806030504020204"/>
       <p:regular r:id="rId17"/>
+    </p:embeddedFont>
+    <p:embeddedFont>
+      <p:font typeface="Nourd Bold" charset="1" panose="00000700000000000000"/>
+      <p:regular r:id="rId18"/>
+    </p:embeddedFont>
+    <p:embeddedFont>
+      <p:font typeface="Nourd Bold Bold" charset="1" panose="00000A00000000000000"/>
+      <p:regular r:id="rId19"/>
     </p:embeddedFont>
   </p:embeddedFontLst>
   <p:defaultTextStyle>
@@ -142,85 +162,7 @@
       </a:defRPr>
     </a:lvl9pPr>
   </p:defaultTextStyle>
-  <p:extLst>
-    <p:ext uri="{EFAFB233-063F-42B5-8137-9DF3F51BA10A}">
-      <p15:sldGuideLst xmlns:p15="http://schemas.microsoft.com/office/powerpoint/2012/main">
-        <p15:guide id="1" orient="horz" pos="2160">
-          <p15:clr>
-            <a:srgbClr val="A4A3A4"/>
-          </p15:clr>
-        </p15:guide>
-        <p15:guide id="2" pos="2880">
-          <p15:clr>
-            <a:srgbClr val="A4A3A4"/>
-          </p15:clr>
-        </p15:guide>
-      </p15:sldGuideLst>
-    </p:ext>
-  </p:extLst>
 </p:presentation>
-</file>
-
-<file path=ppt/revisionInfo.xml><?xml version="1.0" encoding="utf-8"?>
-<p1510:revInfo xmlns:a="http://schemas.openxmlformats.org/drawingml/2006/main" xmlns:r="http://schemas.openxmlformats.org/officeDocument/2006/relationships" xmlns:p1510="http://schemas.microsoft.com/office/powerpoint/2015/10/main">
-  <p1510:revLst>
-    <p1510:client id="{251267A4-16AC-1A72-A1A1-BDF3C5D6E160}" v="2" dt="2023-06-14T09:13:48.970"/>
-    <p1510:client id="{640719A0-E941-A237-FD29-51DAD6E38B17}" v="2" dt="2023-06-14T09:22:50.912"/>
-  </p1510:revLst>
-</p1510:revInfo>
-</file>
-
-<file path=ppt/changesInfos/changesInfo1.xml><?xml version="1.0" encoding="utf-8"?>
-<pc:chgInfo xmlns:a="http://schemas.openxmlformats.org/drawingml/2006/main" xmlns:r="http://schemas.openxmlformats.org/officeDocument/2006/relationships" xmlns:ac="http://schemas.microsoft.com/office/drawing/2013/main/command" xmlns:pc="http://schemas.microsoft.com/office/powerpoint/2013/main/command">
-  <pc:docChgLst>
-    <pc:chgData name="Benjamin Pena" userId="S::benjamin.pena@fun-mooc.fr::6bf8107c-8ff3-4987-9ed4-75b11aa2ad15" providerId="AD" clId="Web-{251267A4-16AC-1A72-A1A1-BDF3C5D6E160}"/>
-    <pc:docChg chg="modSld">
-      <pc:chgData name="Benjamin Pena" userId="S::benjamin.pena@fun-mooc.fr::6bf8107c-8ff3-4987-9ed4-75b11aa2ad15" providerId="AD" clId="Web-{251267A4-16AC-1A72-A1A1-BDF3C5D6E160}" dt="2023-06-14T09:13:48.970" v="1" actId="14100"/>
-      <pc:docMkLst>
-        <pc:docMk/>
-      </pc:docMkLst>
-      <pc:sldChg chg="modSp">
-        <pc:chgData name="Benjamin Pena" userId="S::benjamin.pena@fun-mooc.fr::6bf8107c-8ff3-4987-9ed4-75b11aa2ad15" providerId="AD" clId="Web-{251267A4-16AC-1A72-A1A1-BDF3C5D6E160}" dt="2023-06-14T09:13:48.970" v="1" actId="14100"/>
-        <pc:sldMkLst>
-          <pc:docMk/>
-          <pc:sldMk cId="0" sldId="256"/>
-        </pc:sldMkLst>
-        <pc:spChg chg="mod">
-          <ac:chgData name="Benjamin Pena" userId="S::benjamin.pena@fun-mooc.fr::6bf8107c-8ff3-4987-9ed4-75b11aa2ad15" providerId="AD" clId="Web-{251267A4-16AC-1A72-A1A1-BDF3C5D6E160}" dt="2023-06-14T09:13:48.970" v="1" actId="14100"/>
-          <ac:spMkLst>
-            <pc:docMk/>
-            <pc:sldMk cId="0" sldId="256"/>
-            <ac:spMk id="2" creationId="{00000000-0000-0000-0000-000000000000}"/>
-          </ac:spMkLst>
-        </pc:spChg>
-      </pc:sldChg>
-    </pc:docChg>
-  </pc:docChgLst>
-  <pc:docChgLst>
-    <pc:chgData name="Benjamin Pena" userId="S::benjamin.pena@fun-mooc.fr::6bf8107c-8ff3-4987-9ed4-75b11aa2ad15" providerId="AD" clId="Web-{640719A0-E941-A237-FD29-51DAD6E38B17}"/>
-    <pc:docChg chg="modSld">
-      <pc:chgData name="Benjamin Pena" userId="S::benjamin.pena@fun-mooc.fr::6bf8107c-8ff3-4987-9ed4-75b11aa2ad15" providerId="AD" clId="Web-{640719A0-E941-A237-FD29-51DAD6E38B17}" dt="2023-06-14T09:22:50.912" v="1" actId="14100"/>
-      <pc:docMkLst>
-        <pc:docMk/>
-      </pc:docMkLst>
-      <pc:sldChg chg="modSp">
-        <pc:chgData name="Benjamin Pena" userId="S::benjamin.pena@fun-mooc.fr::6bf8107c-8ff3-4987-9ed4-75b11aa2ad15" providerId="AD" clId="Web-{640719A0-E941-A237-FD29-51DAD6E38B17}" dt="2023-06-14T09:22:50.912" v="1" actId="14100"/>
-        <pc:sldMkLst>
-          <pc:docMk/>
-          <pc:sldMk cId="0" sldId="256"/>
-        </pc:sldMkLst>
-        <pc:spChg chg="mod">
-          <ac:chgData name="Benjamin Pena" userId="S::benjamin.pena@fun-mooc.fr::6bf8107c-8ff3-4987-9ed4-75b11aa2ad15" providerId="AD" clId="Web-{640719A0-E941-A237-FD29-51DAD6E38B17}" dt="2023-06-14T09:22:50.912" v="1" actId="14100"/>
-          <ac:spMkLst>
-            <pc:docMk/>
-            <pc:sldMk cId="0" sldId="256"/>
-            <ac:spMk id="17" creationId="{00000000-0000-0000-0000-000000000000}"/>
-          </ac:spMkLst>
-        </pc:spChg>
-      </pc:sldChg>
-    </pc:docChg>
-  </pc:docChgLst>
-</pc:chgInfo>
 </file>
 
 <file path=ppt/slideLayouts/slideLayout1.xml><?xml version="1.0" encoding="utf-8"?>
@@ -261,9 +203,10 @@
           <a:lstStyle/>
           <a:p>
             <a:r>
-              <a:rPr lang="en-US"/>
+              <a:rPr lang="en-US" smtClean="0"/>
               <a:t>Click to edit Master title style</a:t>
             </a:r>
+            <a:endParaRPr lang="en-US"/>
           </a:p>
         </p:txBody>
       </p:sp>
@@ -379,9 +322,10 @@
           </a:lstStyle>
           <a:p>
             <a:r>
-              <a:rPr lang="en-US"/>
+              <a:rPr lang="en-US" smtClean="0"/>
               <a:t>Click to edit Master subtitle style</a:t>
             </a:r>
+            <a:endParaRPr lang="en-US"/>
           </a:p>
         </p:txBody>
       </p:sp>
@@ -403,7 +347,7 @@
             <a:fld id="{1D8BD707-D9CF-40AE-B4C6-C98DA3205C09}" type="datetimeFigureOut">
               <a:rPr lang="en-US" smtClean="0"/>
               <a:pPr/>
-              <a:t>6/14/2023</a:t>
+              <a:t>8/1/2011</a:t>
             </a:fld>
             <a:endParaRPr lang="en-US"/>
           </a:p>
@@ -493,9 +437,10 @@
           <a:lstStyle/>
           <a:p>
             <a:r>
-              <a:rPr lang="en-US"/>
+              <a:rPr lang="en-US" smtClean="0"/>
               <a:t>Click to edit Master title style</a:t>
             </a:r>
+            <a:endParaRPr lang="en-US"/>
           </a:p>
         </p:txBody>
       </p:sp>
@@ -516,37 +461,38 @@
           <a:p>
             <a:pPr lvl="0"/>
             <a:r>
-              <a:rPr lang="en-US"/>
+              <a:rPr lang="en-US" smtClean="0"/>
               <a:t>Click to edit Master text styles</a:t>
             </a:r>
           </a:p>
           <a:p>
             <a:pPr lvl="1"/>
             <a:r>
-              <a:rPr lang="en-US"/>
+              <a:rPr lang="en-US" smtClean="0"/>
               <a:t>Second level</a:t>
             </a:r>
           </a:p>
           <a:p>
             <a:pPr lvl="2"/>
             <a:r>
-              <a:rPr lang="en-US"/>
+              <a:rPr lang="en-US" smtClean="0"/>
               <a:t>Third level</a:t>
             </a:r>
           </a:p>
           <a:p>
             <a:pPr lvl="3"/>
             <a:r>
-              <a:rPr lang="en-US"/>
+              <a:rPr lang="en-US" smtClean="0"/>
               <a:t>Fourth level</a:t>
             </a:r>
           </a:p>
           <a:p>
             <a:pPr lvl="4"/>
             <a:r>
-              <a:rPr lang="en-US"/>
+              <a:rPr lang="en-US" smtClean="0"/>
               <a:t>Fifth level</a:t>
             </a:r>
+            <a:endParaRPr lang="en-US"/>
           </a:p>
         </p:txBody>
       </p:sp>
@@ -568,7 +514,7 @@
             <a:fld id="{1D8BD707-D9CF-40AE-B4C6-C98DA3205C09}" type="datetimeFigureOut">
               <a:rPr lang="en-US" smtClean="0"/>
               <a:pPr/>
-              <a:t>6/14/2023</a:t>
+              <a:t>8/1/2011</a:t>
             </a:fld>
             <a:endParaRPr lang="en-US"/>
           </a:p>
@@ -663,9 +609,10 @@
           <a:lstStyle/>
           <a:p>
             <a:r>
-              <a:rPr lang="en-US"/>
+              <a:rPr lang="en-US" smtClean="0"/>
               <a:t>Click to edit Master title style</a:t>
             </a:r>
+            <a:endParaRPr lang="en-US"/>
           </a:p>
         </p:txBody>
       </p:sp>
@@ -691,37 +638,38 @@
           <a:p>
             <a:pPr lvl="0"/>
             <a:r>
-              <a:rPr lang="en-US"/>
+              <a:rPr lang="en-US" smtClean="0"/>
               <a:t>Click to edit Master text styles</a:t>
             </a:r>
           </a:p>
           <a:p>
             <a:pPr lvl="1"/>
             <a:r>
-              <a:rPr lang="en-US"/>
+              <a:rPr lang="en-US" smtClean="0"/>
               <a:t>Second level</a:t>
             </a:r>
           </a:p>
           <a:p>
             <a:pPr lvl="2"/>
             <a:r>
-              <a:rPr lang="en-US"/>
+              <a:rPr lang="en-US" smtClean="0"/>
               <a:t>Third level</a:t>
             </a:r>
           </a:p>
           <a:p>
             <a:pPr lvl="3"/>
             <a:r>
-              <a:rPr lang="en-US"/>
+              <a:rPr lang="en-US" smtClean="0"/>
               <a:t>Fourth level</a:t>
             </a:r>
           </a:p>
           <a:p>
             <a:pPr lvl="4"/>
             <a:r>
-              <a:rPr lang="en-US"/>
+              <a:rPr lang="en-US" smtClean="0"/>
               <a:t>Fifth level</a:t>
             </a:r>
+            <a:endParaRPr lang="en-US"/>
           </a:p>
         </p:txBody>
       </p:sp>
@@ -743,7 +691,7 @@
             <a:fld id="{1D8BD707-D9CF-40AE-B4C6-C98DA3205C09}" type="datetimeFigureOut">
               <a:rPr lang="en-US" smtClean="0"/>
               <a:pPr/>
-              <a:t>6/14/2023</a:t>
+              <a:t>8/1/2011</a:t>
             </a:fld>
             <a:endParaRPr lang="en-US"/>
           </a:p>
@@ -833,9 +781,10 @@
           <a:lstStyle/>
           <a:p>
             <a:r>
-              <a:rPr lang="en-US"/>
+              <a:rPr lang="en-US" smtClean="0"/>
               <a:t>Click to edit Master title style</a:t>
             </a:r>
+            <a:endParaRPr lang="en-US"/>
           </a:p>
         </p:txBody>
       </p:sp>
@@ -856,37 +805,38 @@
           <a:p>
             <a:pPr lvl="0"/>
             <a:r>
-              <a:rPr lang="en-US"/>
+              <a:rPr lang="en-US" smtClean="0"/>
               <a:t>Click to edit Master text styles</a:t>
             </a:r>
           </a:p>
           <a:p>
             <a:pPr lvl="1"/>
             <a:r>
-              <a:rPr lang="en-US"/>
+              <a:rPr lang="en-US" smtClean="0"/>
               <a:t>Second level</a:t>
             </a:r>
           </a:p>
           <a:p>
             <a:pPr lvl="2"/>
             <a:r>
-              <a:rPr lang="en-US"/>
+              <a:rPr lang="en-US" smtClean="0"/>
               <a:t>Third level</a:t>
             </a:r>
           </a:p>
           <a:p>
             <a:pPr lvl="3"/>
             <a:r>
-              <a:rPr lang="en-US"/>
+              <a:rPr lang="en-US" smtClean="0"/>
               <a:t>Fourth level</a:t>
             </a:r>
           </a:p>
           <a:p>
             <a:pPr lvl="4"/>
             <a:r>
-              <a:rPr lang="en-US"/>
+              <a:rPr lang="en-US" smtClean="0"/>
               <a:t>Fifth level</a:t>
             </a:r>
+            <a:endParaRPr lang="en-US"/>
           </a:p>
         </p:txBody>
       </p:sp>
@@ -908,7 +858,7 @@
             <a:fld id="{1D8BD707-D9CF-40AE-B4C6-C98DA3205C09}" type="datetimeFigureOut">
               <a:rPr lang="en-US" smtClean="0"/>
               <a:pPr/>
-              <a:t>6/14/2023</a:t>
+              <a:t>8/1/2011</a:t>
             </a:fld>
             <a:endParaRPr lang="en-US"/>
           </a:p>
@@ -1007,9 +957,10 @@
           </a:lstStyle>
           <a:p>
             <a:r>
-              <a:rPr lang="en-US"/>
+              <a:rPr lang="en-US" smtClean="0"/>
               <a:t>Click to edit Master title style</a:t>
             </a:r>
+            <a:endParaRPr lang="en-US"/>
           </a:p>
         </p:txBody>
       </p:sp>
@@ -1126,7 +1077,7 @@
           <a:p>
             <a:pPr lvl="0"/>
             <a:r>
-              <a:rPr lang="en-US"/>
+              <a:rPr lang="en-US" smtClean="0"/>
               <a:t>Click to edit Master text styles</a:t>
             </a:r>
           </a:p>
@@ -1150,7 +1101,7 @@
             <a:fld id="{1D8BD707-D9CF-40AE-B4C6-C98DA3205C09}" type="datetimeFigureOut">
               <a:rPr lang="en-US" smtClean="0"/>
               <a:pPr/>
-              <a:t>6/14/2023</a:t>
+              <a:t>8/1/2011</a:t>
             </a:fld>
             <a:endParaRPr lang="en-US"/>
           </a:p>
@@ -1240,9 +1191,10 @@
           <a:lstStyle/>
           <a:p>
             <a:r>
-              <a:rPr lang="en-US"/>
+              <a:rPr lang="en-US" smtClean="0"/>
               <a:t>Click to edit Master title style</a:t>
             </a:r>
+            <a:endParaRPr lang="en-US"/>
           </a:p>
         </p:txBody>
       </p:sp>
@@ -1296,37 +1248,38 @@
           <a:p>
             <a:pPr lvl="0"/>
             <a:r>
-              <a:rPr lang="en-US"/>
+              <a:rPr lang="en-US" smtClean="0"/>
               <a:t>Click to edit Master text styles</a:t>
             </a:r>
           </a:p>
           <a:p>
             <a:pPr lvl="1"/>
             <a:r>
-              <a:rPr lang="en-US"/>
+              <a:rPr lang="en-US" smtClean="0"/>
               <a:t>Second level</a:t>
             </a:r>
           </a:p>
           <a:p>
             <a:pPr lvl="2"/>
             <a:r>
-              <a:rPr lang="en-US"/>
+              <a:rPr lang="en-US" smtClean="0"/>
               <a:t>Third level</a:t>
             </a:r>
           </a:p>
           <a:p>
             <a:pPr lvl="3"/>
             <a:r>
-              <a:rPr lang="en-US"/>
+              <a:rPr lang="en-US" smtClean="0"/>
               <a:t>Fourth level</a:t>
             </a:r>
           </a:p>
           <a:p>
             <a:pPr lvl="4"/>
             <a:r>
-              <a:rPr lang="en-US"/>
+              <a:rPr lang="en-US" smtClean="0"/>
               <a:t>Fifth level</a:t>
             </a:r>
+            <a:endParaRPr lang="en-US"/>
           </a:p>
         </p:txBody>
       </p:sp>
@@ -1380,37 +1333,38 @@
           <a:p>
             <a:pPr lvl="0"/>
             <a:r>
-              <a:rPr lang="en-US"/>
+              <a:rPr lang="en-US" smtClean="0"/>
               <a:t>Click to edit Master text styles</a:t>
             </a:r>
           </a:p>
           <a:p>
             <a:pPr lvl="1"/>
             <a:r>
-              <a:rPr lang="en-US"/>
+              <a:rPr lang="en-US" smtClean="0"/>
               <a:t>Second level</a:t>
             </a:r>
           </a:p>
           <a:p>
             <a:pPr lvl="2"/>
             <a:r>
-              <a:rPr lang="en-US"/>
+              <a:rPr lang="en-US" smtClean="0"/>
               <a:t>Third level</a:t>
             </a:r>
           </a:p>
           <a:p>
             <a:pPr lvl="3"/>
             <a:r>
-              <a:rPr lang="en-US"/>
+              <a:rPr lang="en-US" smtClean="0"/>
               <a:t>Fourth level</a:t>
             </a:r>
           </a:p>
           <a:p>
             <a:pPr lvl="4"/>
             <a:r>
-              <a:rPr lang="en-US"/>
+              <a:rPr lang="en-US" smtClean="0"/>
               <a:t>Fifth level</a:t>
             </a:r>
+            <a:endParaRPr lang="en-US"/>
           </a:p>
         </p:txBody>
       </p:sp>
@@ -1432,7 +1386,7 @@
             <a:fld id="{1D8BD707-D9CF-40AE-B4C6-C98DA3205C09}" type="datetimeFigureOut">
               <a:rPr lang="en-US" smtClean="0"/>
               <a:pPr/>
-              <a:t>6/14/2023</a:t>
+              <a:t>8/1/2011</a:t>
             </a:fld>
             <a:endParaRPr lang="en-US"/>
           </a:p>
@@ -1526,9 +1480,10 @@
           </a:lstStyle>
           <a:p>
             <a:r>
-              <a:rPr lang="en-US"/>
+              <a:rPr lang="en-US" smtClean="0"/>
               <a:t>Click to edit Master title style</a:t>
             </a:r>
+            <a:endParaRPr lang="en-US"/>
           </a:p>
         </p:txBody>
       </p:sp>
@@ -1591,7 +1546,7 @@
           <a:p>
             <a:pPr lvl="0"/>
             <a:r>
-              <a:rPr lang="en-US"/>
+              <a:rPr lang="en-US" smtClean="0"/>
               <a:t>Click to edit Master text styles</a:t>
             </a:r>
           </a:p>
@@ -1647,37 +1602,38 @@
           <a:p>
             <a:pPr lvl="0"/>
             <a:r>
-              <a:rPr lang="en-US"/>
+              <a:rPr lang="en-US" smtClean="0"/>
               <a:t>Click to edit Master text styles</a:t>
             </a:r>
           </a:p>
           <a:p>
             <a:pPr lvl="1"/>
             <a:r>
-              <a:rPr lang="en-US"/>
+              <a:rPr lang="en-US" smtClean="0"/>
               <a:t>Second level</a:t>
             </a:r>
           </a:p>
           <a:p>
             <a:pPr lvl="2"/>
             <a:r>
-              <a:rPr lang="en-US"/>
+              <a:rPr lang="en-US" smtClean="0"/>
               <a:t>Third level</a:t>
             </a:r>
           </a:p>
           <a:p>
             <a:pPr lvl="3"/>
             <a:r>
-              <a:rPr lang="en-US"/>
+              <a:rPr lang="en-US" smtClean="0"/>
               <a:t>Fourth level</a:t>
             </a:r>
           </a:p>
           <a:p>
             <a:pPr lvl="4"/>
             <a:r>
-              <a:rPr lang="en-US"/>
+              <a:rPr lang="en-US" smtClean="0"/>
               <a:t>Fifth level</a:t>
             </a:r>
+            <a:endParaRPr lang="en-US"/>
           </a:p>
         </p:txBody>
       </p:sp>
@@ -1740,7 +1696,7 @@
           <a:p>
             <a:pPr lvl="0"/>
             <a:r>
-              <a:rPr lang="en-US"/>
+              <a:rPr lang="en-US" smtClean="0"/>
               <a:t>Click to edit Master text styles</a:t>
             </a:r>
           </a:p>
@@ -1796,37 +1752,38 @@
           <a:p>
             <a:pPr lvl="0"/>
             <a:r>
-              <a:rPr lang="en-US"/>
+              <a:rPr lang="en-US" smtClean="0"/>
               <a:t>Click to edit Master text styles</a:t>
             </a:r>
           </a:p>
           <a:p>
             <a:pPr lvl="1"/>
             <a:r>
-              <a:rPr lang="en-US"/>
+              <a:rPr lang="en-US" smtClean="0"/>
               <a:t>Second level</a:t>
             </a:r>
           </a:p>
           <a:p>
             <a:pPr lvl="2"/>
             <a:r>
-              <a:rPr lang="en-US"/>
+              <a:rPr lang="en-US" smtClean="0"/>
               <a:t>Third level</a:t>
             </a:r>
           </a:p>
           <a:p>
             <a:pPr lvl="3"/>
             <a:r>
-              <a:rPr lang="en-US"/>
+              <a:rPr lang="en-US" smtClean="0"/>
               <a:t>Fourth level</a:t>
             </a:r>
           </a:p>
           <a:p>
             <a:pPr lvl="4"/>
             <a:r>
-              <a:rPr lang="en-US"/>
+              <a:rPr lang="en-US" smtClean="0"/>
               <a:t>Fifth level</a:t>
             </a:r>
+            <a:endParaRPr lang="en-US"/>
           </a:p>
         </p:txBody>
       </p:sp>
@@ -1848,7 +1805,7 @@
             <a:fld id="{1D8BD707-D9CF-40AE-B4C6-C98DA3205C09}" type="datetimeFigureOut">
               <a:rPr lang="en-US" smtClean="0"/>
               <a:pPr/>
-              <a:t>6/14/2023</a:t>
+              <a:t>8/1/2011</a:t>
             </a:fld>
             <a:endParaRPr lang="en-US"/>
           </a:p>
@@ -1938,9 +1895,10 @@
           <a:lstStyle/>
           <a:p>
             <a:r>
-              <a:rPr lang="en-US"/>
+              <a:rPr lang="en-US" smtClean="0"/>
               <a:t>Click to edit Master title style</a:t>
             </a:r>
+            <a:endParaRPr lang="en-US"/>
           </a:p>
         </p:txBody>
       </p:sp>
@@ -1962,7 +1920,7 @@
             <a:fld id="{1D8BD707-D9CF-40AE-B4C6-C98DA3205C09}" type="datetimeFigureOut">
               <a:rPr lang="en-US" smtClean="0"/>
               <a:pPr/>
-              <a:t>6/14/2023</a:t>
+              <a:t>8/1/2011</a:t>
             </a:fld>
             <a:endParaRPr lang="en-US"/>
           </a:p>
@@ -2054,7 +2012,7 @@
             <a:fld id="{1D8BD707-D9CF-40AE-B4C6-C98DA3205C09}" type="datetimeFigureOut">
               <a:rPr lang="en-US" smtClean="0"/>
               <a:pPr/>
-              <a:t>6/14/2023</a:t>
+              <a:t>8/1/2011</a:t>
             </a:fld>
             <a:endParaRPr lang="en-US"/>
           </a:p>
@@ -2153,9 +2111,10 @@
           </a:lstStyle>
           <a:p>
             <a:r>
-              <a:rPr lang="en-US"/>
+              <a:rPr lang="en-US" smtClean="0"/>
               <a:t>Click to edit Master title style</a:t>
             </a:r>
+            <a:endParaRPr lang="en-US"/>
           </a:p>
         </p:txBody>
       </p:sp>
@@ -2209,37 +2168,38 @@
           <a:p>
             <a:pPr lvl="0"/>
             <a:r>
-              <a:rPr lang="en-US"/>
+              <a:rPr lang="en-US" smtClean="0"/>
               <a:t>Click to edit Master text styles</a:t>
             </a:r>
           </a:p>
           <a:p>
             <a:pPr lvl="1"/>
             <a:r>
-              <a:rPr lang="en-US"/>
+              <a:rPr lang="en-US" smtClean="0"/>
               <a:t>Second level</a:t>
             </a:r>
           </a:p>
           <a:p>
             <a:pPr lvl="2"/>
             <a:r>
-              <a:rPr lang="en-US"/>
+              <a:rPr lang="en-US" smtClean="0"/>
               <a:t>Third level</a:t>
             </a:r>
           </a:p>
           <a:p>
             <a:pPr lvl="3"/>
             <a:r>
-              <a:rPr lang="en-US"/>
+              <a:rPr lang="en-US" smtClean="0"/>
               <a:t>Fourth level</a:t>
             </a:r>
           </a:p>
           <a:p>
             <a:pPr lvl="4"/>
             <a:r>
-              <a:rPr lang="en-US"/>
+              <a:rPr lang="en-US" smtClean="0"/>
               <a:t>Fifth level</a:t>
             </a:r>
+            <a:endParaRPr lang="en-US"/>
           </a:p>
         </p:txBody>
       </p:sp>
@@ -2302,7 +2262,7 @@
           <a:p>
             <a:pPr lvl="0"/>
             <a:r>
-              <a:rPr lang="en-US"/>
+              <a:rPr lang="en-US" smtClean="0"/>
               <a:t>Click to edit Master text styles</a:t>
             </a:r>
           </a:p>
@@ -2326,7 +2286,7 @@
             <a:fld id="{1D8BD707-D9CF-40AE-B4C6-C98DA3205C09}" type="datetimeFigureOut">
               <a:rPr lang="en-US" smtClean="0"/>
               <a:pPr/>
-              <a:t>6/14/2023</a:t>
+              <a:t>8/1/2011</a:t>
             </a:fld>
             <a:endParaRPr lang="en-US"/>
           </a:p>
@@ -2425,9 +2385,10 @@
           </a:lstStyle>
           <a:p>
             <a:r>
-              <a:rPr lang="en-US"/>
+              <a:rPr lang="en-US" smtClean="0"/>
               <a:t>Click to edit Master title style</a:t>
             </a:r>
+            <a:endParaRPr lang="en-US"/>
           </a:p>
         </p:txBody>
       </p:sp>
@@ -2551,7 +2512,7 @@
           <a:p>
             <a:pPr lvl="0"/>
             <a:r>
-              <a:rPr lang="en-US"/>
+              <a:rPr lang="en-US" smtClean="0"/>
               <a:t>Click to edit Master text styles</a:t>
             </a:r>
           </a:p>
@@ -2575,7 +2536,7 @@
             <a:fld id="{1D8BD707-D9CF-40AE-B4C6-C98DA3205C09}" type="datetimeFigureOut">
               <a:rPr lang="en-US" smtClean="0"/>
               <a:pPr/>
-              <a:t>6/14/2023</a:t>
+              <a:t>8/1/2011</a:t>
             </a:fld>
             <a:endParaRPr lang="en-US"/>
           </a:p>
@@ -2680,9 +2641,10 @@
           <a:lstStyle/>
           <a:p>
             <a:r>
-              <a:rPr lang="en-US"/>
+              <a:rPr lang="en-US" smtClean="0"/>
               <a:t>Click to edit Master title style</a:t>
             </a:r>
+            <a:endParaRPr lang="en-US"/>
           </a:p>
         </p:txBody>
       </p:sp>
@@ -2713,37 +2675,38 @@
           <a:p>
             <a:pPr lvl="0"/>
             <a:r>
-              <a:rPr lang="en-US"/>
+              <a:rPr lang="en-US" smtClean="0"/>
               <a:t>Click to edit Master text styles</a:t>
             </a:r>
           </a:p>
           <a:p>
             <a:pPr lvl="1"/>
             <a:r>
-              <a:rPr lang="en-US"/>
+              <a:rPr lang="en-US" smtClean="0"/>
               <a:t>Second level</a:t>
             </a:r>
           </a:p>
           <a:p>
             <a:pPr lvl="2"/>
             <a:r>
-              <a:rPr lang="en-US"/>
+              <a:rPr lang="en-US" smtClean="0"/>
               <a:t>Third level</a:t>
             </a:r>
           </a:p>
           <a:p>
             <a:pPr lvl="3"/>
             <a:r>
-              <a:rPr lang="en-US"/>
+              <a:rPr lang="en-US" smtClean="0"/>
               <a:t>Fourth level</a:t>
             </a:r>
           </a:p>
           <a:p>
             <a:pPr lvl="4"/>
             <a:r>
-              <a:rPr lang="en-US"/>
+              <a:rPr lang="en-US" smtClean="0"/>
               <a:t>Fifth level</a:t>
             </a:r>
+            <a:endParaRPr lang="en-US"/>
           </a:p>
         </p:txBody>
       </p:sp>
@@ -2783,7 +2746,7 @@
             <a:fld id="{1D8BD707-D9CF-40AE-B4C6-C98DA3205C09}" type="datetimeFigureOut">
               <a:rPr lang="en-US" smtClean="0"/>
               <a:pPr/>
-              <a:t>6/14/2023</a:t>
+              <a:t>8/1/2011</a:t>
             </a:fld>
             <a:endParaRPr lang="en-US"/>
           </a:p>
@@ -3138,7 +3101,7 @@
 </file>
 
 <file path=ppt/slides/slide1.xml><?xml version="1.0" encoding="utf-8"?>
-<p:sld xmlns:a="http://schemas.openxmlformats.org/drawingml/2006/main" xmlns:r="http://schemas.openxmlformats.org/officeDocument/2006/relationships" xmlns:p="http://schemas.openxmlformats.org/presentationml/2006/main">
+<p:sld xmlns:p="http://schemas.openxmlformats.org/presentationml/2006/main" xmlns:a="http://schemas.openxmlformats.org/drawingml/2006/main" xmlns:r="http://schemas.openxmlformats.org/officeDocument/2006/relationships">
   <p:cSld>
     <p:spTree>
       <p:nvGrpSpPr>
@@ -3156,23 +3119,23 @@
       </p:grpSpPr>
       <p:sp>
         <p:nvSpPr>
-          <p:cNvPr id="2" name="Freeform 2"/>
+          <p:cNvPr name="Freeform 2" id="2"/>
           <p:cNvSpPr/>
           <p:nvPr/>
         </p:nvSpPr>
         <p:spPr>
-          <a:xfrm>
-            <a:off x="-5392" y="-1452271"/>
-            <a:ext cx="32917866" cy="45400986"/>
+          <a:xfrm flipH="false" flipV="false" rot="0">
+            <a:off x="0" y="-1152682"/>
+            <a:ext cx="31882696" cy="45090436"/>
           </a:xfrm>
           <a:custGeom>
             <a:avLst/>
             <a:gdLst/>
             <a:ahLst/>
             <a:cxnLst/>
-            <a:rect l="l" t="t" r="r" b="b"/>
+            <a:rect r="r" b="b" t="t" l="l"/>
             <a:pathLst>
-              <a:path w="31882696" h="45090436">
+              <a:path h="45090436" w="31882696">
                 <a:moveTo>
                   <a:pt x="0" y="0"/>
                 </a:moveTo>
@@ -3195,19 +3158,19 @@
           <a:blipFill>
             <a:blip r:embed="rId2"/>
             <a:stretch>
-              <a:fillRect/>
+              <a:fillRect l="0" t="0" r="0" b="0"/>
             </a:stretch>
           </a:blipFill>
         </p:spPr>
       </p:sp>
       <p:sp>
         <p:nvSpPr>
-          <p:cNvPr id="3" name="Freeform 3"/>
+          <p:cNvPr name="Freeform 3" id="3"/>
           <p:cNvSpPr/>
           <p:nvPr/>
         </p:nvSpPr>
         <p:spPr>
-          <a:xfrm>
+          <a:xfrm flipH="false" flipV="false" rot="0">
             <a:off x="4892997" y="23008025"/>
             <a:ext cx="3761850" cy="3727651"/>
           </a:xfrm>
@@ -3216,9 +3179,9 @@
             <a:gdLst/>
             <a:ahLst/>
             <a:cxnLst/>
-            <a:rect l="l" t="t" r="r" b="b"/>
+            <a:rect r="r" b="b" t="t" l="l"/>
             <a:pathLst>
-              <a:path w="3761850" h="3727651">
+              <a:path h="3727651" w="3761850">
                 <a:moveTo>
                   <a:pt x="0" y="0"/>
                 </a:moveTo>
@@ -3247,19 +3210,19 @@
               </a:extLst>
             </a:blip>
             <a:stretch>
-              <a:fillRect/>
+              <a:fillRect l="0" t="0" r="0" b="0"/>
             </a:stretch>
           </a:blipFill>
         </p:spPr>
       </p:sp>
       <p:sp>
         <p:nvSpPr>
-          <p:cNvPr id="4" name="Freeform 4"/>
+          <p:cNvPr name="Freeform 4" id="4"/>
           <p:cNvSpPr/>
           <p:nvPr/>
         </p:nvSpPr>
         <p:spPr>
-          <a:xfrm>
+          <a:xfrm flipH="false" flipV="false" rot="0">
             <a:off x="4892997" y="35502052"/>
             <a:ext cx="3761850" cy="3727651"/>
           </a:xfrm>
@@ -3268,9 +3231,9 @@
             <a:gdLst/>
             <a:ahLst/>
             <a:cxnLst/>
-            <a:rect l="l" t="t" r="r" b="b"/>
+            <a:rect r="r" b="b" t="t" l="l"/>
             <a:pathLst>
-              <a:path w="3761850" h="3727651">
+              <a:path h="3727651" w="3761850">
                 <a:moveTo>
                   <a:pt x="0" y="0"/>
                 </a:moveTo>
@@ -3299,20 +3262,20 @@
               </a:extLst>
             </a:blip>
             <a:stretch>
-              <a:fillRect/>
+              <a:fillRect l="0" t="0" r="0" b="0"/>
             </a:stretch>
           </a:blipFill>
         </p:spPr>
       </p:sp>
       <p:sp>
         <p:nvSpPr>
-          <p:cNvPr id="5" name="Freeform 5"/>
+          <p:cNvPr name="Freeform 5" id="5"/>
           <p:cNvSpPr/>
           <p:nvPr/>
         </p:nvSpPr>
         <p:spPr>
-          <a:xfrm>
-            <a:off x="13419994" y="30193016"/>
+          <a:xfrm flipH="false" flipV="false" rot="0">
+            <a:off x="16597421" y="25572201"/>
             <a:ext cx="4546566" cy="4546566"/>
           </a:xfrm>
           <a:custGeom>
@@ -3320,9 +3283,9 @@
             <a:gdLst/>
             <a:ahLst/>
             <a:cxnLst/>
-            <a:rect l="l" t="t" r="r" b="b"/>
+            <a:rect r="r" b="b" t="t" l="l"/>
             <a:pathLst>
-              <a:path w="4546566" h="4546566">
+              <a:path h="4546566" w="4546566">
                 <a:moveTo>
                   <a:pt x="0" y="0"/>
                 </a:moveTo>
@@ -3330,10 +3293,10 @@
                   <a:pt x="4546566" y="0"/>
                 </a:lnTo>
                 <a:lnTo>
-                  <a:pt x="4546566" y="4546565"/>
-                </a:lnTo>
-                <a:lnTo>
-                  <a:pt x="0" y="4546565"/>
+                  <a:pt x="4546566" y="4546566"/>
+                </a:lnTo>
+                <a:lnTo>
+                  <a:pt x="0" y="4546566"/>
                 </a:lnTo>
                 <a:lnTo>
                   <a:pt x="0" y="0"/>
@@ -3345,19 +3308,19 @@
           <a:blipFill>
             <a:blip r:embed="rId5"/>
             <a:stretch>
-              <a:fillRect/>
+              <a:fillRect l="0" t="0" r="0" b="0"/>
             </a:stretch>
           </a:blipFill>
         </p:spPr>
       </p:sp>
       <p:sp>
         <p:nvSpPr>
-          <p:cNvPr id="6" name="Freeform 6"/>
+          <p:cNvPr name="Freeform 6" id="6"/>
           <p:cNvSpPr/>
           <p:nvPr/>
         </p:nvSpPr>
         <p:spPr>
-          <a:xfrm>
+          <a:xfrm flipH="false" flipV="false" rot="0">
             <a:off x="15304394" y="41159999"/>
             <a:ext cx="4273643" cy="1985464"/>
           </a:xfrm>
@@ -3366,9 +3329,9 @@
             <a:gdLst/>
             <a:ahLst/>
             <a:cxnLst/>
-            <a:rect l="l" t="t" r="r" b="b"/>
+            <a:rect r="r" b="b" t="t" l="l"/>
             <a:pathLst>
-              <a:path w="4273643" h="1985464">
+              <a:path h="1985464" w="4273643">
                 <a:moveTo>
                   <a:pt x="0" y="0"/>
                 </a:moveTo>
@@ -3391,19 +3354,19 @@
           <a:blipFill>
             <a:blip r:embed="rId6"/>
             <a:stretch>
-              <a:fillRect/>
+              <a:fillRect l="0" t="0" r="0" b="0"/>
             </a:stretch>
           </a:blipFill>
         </p:spPr>
       </p:sp>
       <p:sp>
         <p:nvSpPr>
-          <p:cNvPr id="7" name="Freeform 7"/>
+          <p:cNvPr name="Freeform 7" id="7"/>
           <p:cNvSpPr/>
           <p:nvPr/>
         </p:nvSpPr>
         <p:spPr>
-          <a:xfrm>
+          <a:xfrm flipH="false" flipV="false" rot="0">
             <a:off x="20359087" y="41227935"/>
             <a:ext cx="6053207" cy="1849591"/>
           </a:xfrm>
@@ -3412,9 +3375,9 @@
             <a:gdLst/>
             <a:ahLst/>
             <a:cxnLst/>
-            <a:rect l="l" t="t" r="r" b="b"/>
+            <a:rect r="r" b="b" t="t" l="l"/>
             <a:pathLst>
-              <a:path w="6053207" h="1849591">
+              <a:path h="1849591" w="6053207">
                 <a:moveTo>
                   <a:pt x="0" y="0"/>
                 </a:moveTo>
@@ -3444,12 +3407,12 @@
       </p:sp>
       <p:sp>
         <p:nvSpPr>
-          <p:cNvPr id="8" name="Freeform 8"/>
+          <p:cNvPr name="Freeform 8" id="8"/>
           <p:cNvSpPr/>
           <p:nvPr/>
         </p:nvSpPr>
         <p:spPr>
-          <a:xfrm>
+          <a:xfrm flipH="false" flipV="false" rot="0">
             <a:off x="4892997" y="27173826"/>
             <a:ext cx="3761850" cy="3727651"/>
           </a:xfrm>
@@ -3458,9 +3421,9 @@
             <a:gdLst/>
             <a:ahLst/>
             <a:cxnLst/>
-            <a:rect l="l" t="t" r="r" b="b"/>
+            <a:rect r="r" b="b" t="t" l="l"/>
             <a:pathLst>
-              <a:path w="3761850" h="3727651">
+              <a:path h="3727651" w="3761850">
                 <a:moveTo>
                   <a:pt x="0" y="0"/>
                 </a:moveTo>
@@ -3489,19 +3452,19 @@
               </a:extLst>
             </a:blip>
             <a:stretch>
-              <a:fillRect/>
+              <a:fillRect l="0" t="0" r="0" b="0"/>
             </a:stretch>
           </a:blipFill>
         </p:spPr>
       </p:sp>
       <p:sp>
         <p:nvSpPr>
-          <p:cNvPr id="9" name="Freeform 9"/>
+          <p:cNvPr name="Freeform 9" id="9"/>
           <p:cNvSpPr/>
           <p:nvPr/>
         </p:nvSpPr>
         <p:spPr>
-          <a:xfrm>
+          <a:xfrm flipH="false" flipV="false" rot="0">
             <a:off x="4892997" y="31339627"/>
             <a:ext cx="3761850" cy="3727651"/>
           </a:xfrm>
@@ -3510,9 +3473,9 @@
             <a:gdLst/>
             <a:ahLst/>
             <a:cxnLst/>
-            <a:rect l="l" t="t" r="r" b="b"/>
+            <a:rect r="r" b="b" t="t" l="l"/>
             <a:pathLst>
-              <a:path w="3761850" h="3727651">
+              <a:path h="3727651" w="3761850">
                 <a:moveTo>
                   <a:pt x="0" y="0"/>
                 </a:moveTo>
@@ -3541,20 +3504,20 @@
               </a:extLst>
             </a:blip>
             <a:stretch>
-              <a:fillRect/>
+              <a:fillRect l="0" t="0" r="0" b="0"/>
             </a:stretch>
           </a:blipFill>
         </p:spPr>
       </p:sp>
       <p:sp>
         <p:nvSpPr>
-          <p:cNvPr id="10" name="Freeform 10"/>
+          <p:cNvPr name="Freeform 10" id="10"/>
           <p:cNvSpPr/>
           <p:nvPr/>
         </p:nvSpPr>
         <p:spPr>
-          <a:xfrm>
-            <a:off x="17069464" y="25074331"/>
+          <a:xfrm flipH="false" flipV="false" rot="0">
+            <a:off x="12894650" y="21945600"/>
             <a:ext cx="4546566" cy="4546566"/>
           </a:xfrm>
           <a:custGeom>
@@ -3562,9 +3525,9 @@
             <a:gdLst/>
             <a:ahLst/>
             <a:cxnLst/>
-            <a:rect l="l" t="t" r="r" b="b"/>
+            <a:rect r="r" b="b" t="t" l="l"/>
             <a:pathLst>
-              <a:path w="4546566" h="4546566">
+              <a:path h="4546566" w="4546566">
                 <a:moveTo>
                   <a:pt x="0" y="0"/>
                 </a:moveTo>
@@ -3587,19 +3550,19 @@
           <a:blipFill>
             <a:blip r:embed="rId5"/>
             <a:stretch>
-              <a:fillRect/>
+              <a:fillRect l="0" t="0" r="0" b="0"/>
             </a:stretch>
           </a:blipFill>
         </p:spPr>
       </p:sp>
       <p:sp>
         <p:nvSpPr>
-          <p:cNvPr id="11" name="Freeform 11"/>
+          <p:cNvPr name="Freeform 11" id="11"/>
           <p:cNvSpPr/>
           <p:nvPr/>
         </p:nvSpPr>
         <p:spPr>
-          <a:xfrm>
+          <a:xfrm flipH="false" flipV="false" rot="0">
             <a:off x="6773922" y="40058378"/>
             <a:ext cx="3879375" cy="3879375"/>
           </a:xfrm>
@@ -3608,9 +3571,9 @@
             <a:gdLst/>
             <a:ahLst/>
             <a:cxnLst/>
-            <a:rect l="l" t="t" r="r" b="b"/>
+            <a:rect r="r" b="b" t="t" l="l"/>
             <a:pathLst>
-              <a:path w="3879375" h="3879375">
+              <a:path h="3879375" w="3879375">
                 <a:moveTo>
                   <a:pt x="0" y="0"/>
                 </a:moveTo>
@@ -3633,19 +3596,19 @@
           <a:blipFill>
             <a:blip r:embed="rId8"/>
             <a:stretch>
-              <a:fillRect/>
+              <a:fillRect l="0" t="0" r="0" b="0"/>
             </a:stretch>
           </a:blipFill>
         </p:spPr>
       </p:sp>
       <p:sp>
         <p:nvSpPr>
-          <p:cNvPr id="12" name="Freeform 12"/>
+          <p:cNvPr name="Freeform 12" id="12"/>
           <p:cNvSpPr/>
           <p:nvPr/>
         </p:nvSpPr>
         <p:spPr>
-          <a:xfrm>
+          <a:xfrm flipH="false" flipV="false" rot="0">
             <a:off x="6785562" y="4589954"/>
             <a:ext cx="2237946" cy="2182689"/>
           </a:xfrm>
@@ -3654,9 +3617,9 @@
             <a:gdLst/>
             <a:ahLst/>
             <a:cxnLst/>
-            <a:rect l="l" t="t" r="r" b="b"/>
+            <a:rect r="r" b="b" t="t" l="l"/>
             <a:pathLst>
-              <a:path w="2237946" h="2182689">
+              <a:path h="2182689" w="2237946">
                 <a:moveTo>
                   <a:pt x="0" y="0"/>
                 </a:moveTo>
@@ -3679,19 +3642,19 @@
           <a:blipFill>
             <a:blip r:embed="rId9"/>
             <a:stretch>
-              <a:fillRect/>
+              <a:fillRect l="0" t="0" r="0" b="0"/>
             </a:stretch>
           </a:blipFill>
         </p:spPr>
       </p:sp>
       <p:sp>
         <p:nvSpPr>
-          <p:cNvPr id="13" name="Freeform 13"/>
+          <p:cNvPr name="Freeform 13" id="13"/>
           <p:cNvSpPr/>
           <p:nvPr/>
         </p:nvSpPr>
         <p:spPr>
-          <a:xfrm>
+          <a:xfrm flipH="false" flipV="false" rot="0">
             <a:off x="20149890" y="4707304"/>
             <a:ext cx="2589380" cy="2065338"/>
           </a:xfrm>
@@ -3700,9 +3663,9 @@
             <a:gdLst/>
             <a:ahLst/>
             <a:cxnLst/>
-            <a:rect l="l" t="t" r="r" b="b"/>
+            <a:rect r="r" b="b" t="t" l="l"/>
             <a:pathLst>
-              <a:path w="2589380" h="2065338">
+              <a:path h="2065338" w="2589380">
                 <a:moveTo>
                   <a:pt x="0" y="0"/>
                 </a:moveTo>
@@ -3725,19 +3688,19 @@
           <a:blipFill>
             <a:blip r:embed="rId10"/>
             <a:stretch>
-              <a:fillRect/>
+              <a:fillRect l="0" t="0" r="0" b="0"/>
             </a:stretch>
           </a:blipFill>
         </p:spPr>
       </p:sp>
       <p:sp>
         <p:nvSpPr>
-          <p:cNvPr id="14" name="Freeform 14"/>
+          <p:cNvPr name="Freeform 14" id="14"/>
           <p:cNvSpPr/>
           <p:nvPr/>
         </p:nvSpPr>
         <p:spPr>
-          <a:xfrm>
+          <a:xfrm flipH="false" flipV="false" rot="0">
             <a:off x="13693484" y="4527482"/>
             <a:ext cx="2653372" cy="2245161"/>
           </a:xfrm>
@@ -3746,9 +3709,9 @@
             <a:gdLst/>
             <a:ahLst/>
             <a:cxnLst/>
-            <a:rect l="l" t="t" r="r" b="b"/>
+            <a:rect r="r" b="b" t="t" l="l"/>
             <a:pathLst>
-              <a:path w="2653372" h="2245161">
+              <a:path h="2245161" w="2653372">
                 <a:moveTo>
                   <a:pt x="0" y="0"/>
                 </a:moveTo>
@@ -3771,19 +3734,19 @@
           <a:blipFill>
             <a:blip r:embed="rId11"/>
             <a:stretch>
-              <a:fillRect/>
+              <a:fillRect l="0" t="0" r="0" b="0"/>
             </a:stretch>
           </a:blipFill>
         </p:spPr>
       </p:sp>
       <p:sp>
         <p:nvSpPr>
-          <p:cNvPr id="15" name="Freeform 15"/>
+          <p:cNvPr name="Freeform 15" id="15"/>
           <p:cNvSpPr/>
           <p:nvPr/>
         </p:nvSpPr>
         <p:spPr>
-          <a:xfrm>
+          <a:xfrm flipH="false" flipV="false" rot="0">
             <a:off x="25813935" y="4527482"/>
             <a:ext cx="2733239" cy="2245161"/>
           </a:xfrm>
@@ -3792,9 +3755,9 @@
             <a:gdLst/>
             <a:ahLst/>
             <a:cxnLst/>
-            <a:rect l="l" t="t" r="r" b="b"/>
+            <a:rect r="r" b="b" t="t" l="l"/>
             <a:pathLst>
-              <a:path w="2733239" h="2245161">
+              <a:path h="2245161" w="2733239">
                 <a:moveTo>
                   <a:pt x="0" y="0"/>
                 </a:moveTo>
@@ -3817,19 +3780,19 @@
           <a:blipFill>
             <a:blip r:embed="rId12"/>
             <a:stretch>
-              <a:fillRect/>
+              <a:fillRect l="0" t="0" r="0" b="0"/>
             </a:stretch>
           </a:blipFill>
         </p:spPr>
       </p:sp>
       <p:sp>
         <p:nvSpPr>
-          <p:cNvPr id="16" name="Freeform 16"/>
+          <p:cNvPr name="Freeform 16" id="16"/>
           <p:cNvSpPr/>
           <p:nvPr/>
         </p:nvSpPr>
         <p:spPr>
-          <a:xfrm>
+          <a:xfrm flipH="false" flipV="false" rot="0">
             <a:off x="11438176" y="40610146"/>
             <a:ext cx="3085168" cy="3085168"/>
           </a:xfrm>
@@ -3838,9 +3801,9 @@
             <a:gdLst/>
             <a:ahLst/>
             <a:cxnLst/>
-            <a:rect l="l" t="t" r="r" b="b"/>
+            <a:rect r="r" b="b" t="t" l="l"/>
             <a:pathLst>
-              <a:path w="3085168" h="3085168">
+              <a:path h="3085168" w="3085168">
                 <a:moveTo>
                   <a:pt x="0" y="0"/>
                 </a:moveTo>
@@ -3863,19 +3826,19 @@
           <a:blipFill>
             <a:blip r:embed="rId13"/>
             <a:stretch>
-              <a:fillRect/>
+              <a:fillRect l="0" t="0" r="0" b="0"/>
             </a:stretch>
           </a:blipFill>
         </p:spPr>
       </p:sp>
       <p:sp>
         <p:nvSpPr>
-          <p:cNvPr id="17" name="Freeform 17"/>
+          <p:cNvPr name="Freeform 17" id="17"/>
           <p:cNvSpPr/>
           <p:nvPr/>
         </p:nvSpPr>
         <p:spPr>
-          <a:xfrm rot="2160636">
+          <a:xfrm flipH="false" flipV="false" rot="2160636">
             <a:off x="22501870" y="601891"/>
             <a:ext cx="12419988" cy="3229197"/>
           </a:xfrm>
@@ -3884,9 +3847,9 @@
             <a:gdLst/>
             <a:ahLst/>
             <a:cxnLst/>
-            <a:rect l="l" t="t" r="r" b="b"/>
+            <a:rect r="r" b="b" t="t" l="l"/>
             <a:pathLst>
-              <a:path w="12419988" h="3229197">
+              <a:path h="3229197" w="12419988">
                 <a:moveTo>
                   <a:pt x="0" y="0"/>
                 </a:moveTo>
@@ -3915,19 +3878,19 @@
               </a:extLst>
             </a:blip>
             <a:stretch>
-              <a:fillRect/>
+              <a:fillRect l="0" t="0" r="0" b="0"/>
             </a:stretch>
           </a:blipFill>
         </p:spPr>
       </p:sp>
       <p:sp>
         <p:nvSpPr>
-          <p:cNvPr id="18" name="Freeform 18"/>
+          <p:cNvPr name="Freeform 18" id="18"/>
           <p:cNvSpPr/>
           <p:nvPr/>
         </p:nvSpPr>
         <p:spPr>
-          <a:xfrm>
+          <a:xfrm flipH="false" flipV="false" rot="0">
             <a:off x="8040352" y="9729885"/>
             <a:ext cx="19846307" cy="11537130"/>
           </a:xfrm>
@@ -3936,9 +3899,9 @@
             <a:gdLst/>
             <a:ahLst/>
             <a:cxnLst/>
-            <a:rect l="l" t="t" r="r" b="b"/>
+            <a:rect r="r" b="b" t="t" l="l"/>
             <a:pathLst>
-              <a:path w="19846307" h="11537130">
+              <a:path h="11537130" w="19846307">
                 <a:moveTo>
                   <a:pt x="0" y="0"/>
                 </a:moveTo>
@@ -3961,19 +3924,19 @@
           <a:blipFill>
             <a:blip r:embed="rId16"/>
             <a:stretch>
-              <a:fillRect/>
+              <a:fillRect l="0" t="0" r="0" b="0"/>
             </a:stretch>
           </a:blipFill>
         </p:spPr>
       </p:sp>
       <p:sp>
         <p:nvSpPr>
-          <p:cNvPr id="19" name="TextBox 19"/>
-          <p:cNvSpPr txBox="1"/>
+          <p:cNvPr name="TextBox 19" id="19"/>
+          <p:cNvSpPr txBox="true"/>
           <p:nvPr/>
         </p:nvSpPr>
         <p:spPr>
-          <a:xfrm>
+          <a:xfrm rot="0">
             <a:off x="4519590" y="1490910"/>
             <a:ext cx="21444826" cy="1741172"/>
           </a:xfrm>
@@ -3982,7 +3945,7 @@
           </a:prstGeom>
         </p:spPr>
         <p:txBody>
-          <a:bodyPr lIns="0" tIns="0" rIns="0" bIns="0" rtlCol="0" anchor="t">
+          <a:bodyPr anchor="t" rtlCol="false" tIns="0" lIns="0" bIns="0" rIns="0">
             <a:spAutoFit/>
           </a:bodyPr>
           <a:lstStyle/>
@@ -4015,12 +3978,12 @@
       </p:sp>
       <p:sp>
         <p:nvSpPr>
-          <p:cNvPr id="20" name="TextBox 20"/>
-          <p:cNvSpPr txBox="1"/>
+          <p:cNvPr name="TextBox 20" id="20"/>
+          <p:cNvSpPr txBox="true"/>
           <p:nvPr/>
         </p:nvSpPr>
         <p:spPr>
-          <a:xfrm>
+          <a:xfrm rot="0">
             <a:off x="5235464" y="21453754"/>
             <a:ext cx="26733401" cy="1234183"/>
           </a:xfrm>
@@ -4029,7 +3992,7 @@
           </a:prstGeom>
         </p:spPr>
         <p:txBody>
-          <a:bodyPr lIns="0" tIns="0" rIns="0" bIns="0" rtlCol="0" anchor="t">
+          <a:bodyPr anchor="t" rtlCol="false" tIns="0" lIns="0" bIns="0" rIns="0">
             <a:spAutoFit/>
           </a:bodyPr>
           <a:lstStyle/>
@@ -4089,12 +4052,12 @@
       </p:sp>
       <p:sp>
         <p:nvSpPr>
-          <p:cNvPr id="21" name="TextBox 21"/>
-          <p:cNvSpPr txBox="1"/>
+          <p:cNvPr name="TextBox 21" id="21"/>
+          <p:cNvSpPr txBox="true"/>
           <p:nvPr/>
         </p:nvSpPr>
         <p:spPr>
-          <a:xfrm>
+          <a:xfrm rot="0">
             <a:off x="5643308" y="23510701"/>
             <a:ext cx="2261227" cy="2438455"/>
           </a:xfrm>
@@ -4103,7 +4066,7 @@
           </a:prstGeom>
         </p:spPr>
         <p:txBody>
-          <a:bodyPr lIns="0" tIns="0" rIns="0" bIns="0" rtlCol="0" anchor="t">
+          <a:bodyPr anchor="t" rtlCol="false" tIns="0" lIns="0" bIns="0" rIns="0">
             <a:spAutoFit/>
           </a:bodyPr>
           <a:lstStyle/>
@@ -4130,12 +4093,12 @@
       </p:sp>
       <p:sp>
         <p:nvSpPr>
-          <p:cNvPr id="22" name="TextBox 22"/>
-          <p:cNvSpPr txBox="1"/>
+          <p:cNvPr name="TextBox 22" id="22"/>
+          <p:cNvSpPr txBox="true"/>
           <p:nvPr/>
         </p:nvSpPr>
         <p:spPr>
-          <a:xfrm>
+          <a:xfrm rot="0">
             <a:off x="5643308" y="36008538"/>
             <a:ext cx="2261227" cy="2438455"/>
           </a:xfrm>
@@ -4144,7 +4107,7 @@
           </a:prstGeom>
         </p:spPr>
         <p:txBody>
-          <a:bodyPr lIns="0" tIns="0" rIns="0" bIns="0" rtlCol="0" anchor="t">
+          <a:bodyPr anchor="t" rtlCol="false" tIns="0" lIns="0" bIns="0" rIns="0">
             <a:spAutoFit/>
           </a:bodyPr>
           <a:lstStyle/>
@@ -4171,13 +4134,13 @@
       </p:sp>
       <p:sp>
         <p:nvSpPr>
-          <p:cNvPr id="23" name="TextBox 23"/>
-          <p:cNvSpPr txBox="1"/>
+          <p:cNvPr name="TextBox 23" id="23"/>
+          <p:cNvSpPr txBox="true"/>
           <p:nvPr/>
         </p:nvSpPr>
         <p:spPr>
-          <a:xfrm>
-            <a:off x="9524022" y="23274826"/>
+          <a:xfrm rot="0">
+            <a:off x="9212289" y="31459542"/>
             <a:ext cx="22825545" cy="3062605"/>
           </a:xfrm>
           <a:prstGeom prst="rect">
@@ -4185,7 +4148,7 @@
           </a:prstGeom>
         </p:spPr>
         <p:txBody>
-          <a:bodyPr lIns="0" tIns="0" rIns="0" bIns="0" rtlCol="0" anchor="t">
+          <a:bodyPr anchor="t" rtlCol="false" tIns="0" lIns="0" bIns="0" rIns="0">
             <a:spAutoFit/>
           </a:bodyPr>
           <a:lstStyle/>
@@ -4224,7 +4187,7 @@
             </a:r>
           </a:p>
           <a:p>
-            <a:pPr marL="0" lvl="0" indent="0">
+            <a:pPr marL="0" indent="0" lvl="0">
               <a:lnSpc>
                 <a:spcPts val="8120"/>
               </a:lnSpc>
@@ -4239,28 +4202,47 @@
                 </a:solidFill>
                 <a:latin typeface="Open Sans Light Italics"/>
               </a:rPr>
-              <a:t>Contactez FUN pour obtenir un accès au BBB de l’ESR puis configurez votre instance Pod ! (fun.ops@fun-mooc.fr)</a:t>
-            </a:r>
-          </a:p>
-        </p:txBody>
-      </p:sp>
-      <p:sp>
-        <p:nvSpPr>
-          <p:cNvPr id="24" name="TextBox 24"/>
-          <p:cNvSpPr txBox="1"/>
+              <a:t>Contactez FUN </a:t>
+            </a:r>
+            <a:r>
+              <a:rPr lang="en-US" sz="5800" u="sng">
+                <a:solidFill>
+                  <a:srgbClr val="2A347B"/>
+                </a:solidFill>
+                <a:latin typeface="Open Sans Light Italics"/>
+                <a:hlinkClick r:id="rId17" tooltip="https://www.fun-mooc.help/hc/fr/requests/new?ticket_form_id=9122250595357"/>
+              </a:rPr>
+              <a:t>via ce formulaire</a:t>
+            </a:r>
+            <a:r>
+              <a:rPr lang="en-US" sz="5800">
+                <a:solidFill>
+                  <a:srgbClr val="2A347B"/>
+                </a:solidFill>
+                <a:latin typeface="Open Sans Light Italics"/>
+              </a:rPr>
+              <a:t> pour obtenir un accès au BBB de l’ESR puis configurez votre instance Pod !</a:t>
+            </a:r>
+          </a:p>
+        </p:txBody>
+      </p:sp>
+      <p:sp>
+        <p:nvSpPr>
+          <p:cNvPr name="TextBox 24" id="24"/>
+          <p:cNvSpPr txBox="true"/>
           <p:nvPr/>
         </p:nvSpPr>
         <p:spPr>
-          <a:xfrm>
-            <a:off x="9524022" y="26930087"/>
-            <a:ext cx="20499369" cy="4091305"/>
+          <a:xfrm rot="0">
+            <a:off x="9212289" y="27444437"/>
+            <a:ext cx="22825545" cy="3062605"/>
           </a:xfrm>
           <a:prstGeom prst="rect">
             <a:avLst/>
           </a:prstGeom>
         </p:spPr>
         <p:txBody>
-          <a:bodyPr lIns="0" tIns="0" rIns="0" bIns="0" rtlCol="0" anchor="t">
+          <a:bodyPr anchor="t" rtlCol="false" tIns="0" lIns="0" bIns="0" rIns="0">
             <a:spAutoFit/>
           </a:bodyPr>
           <a:lstStyle/>
@@ -4299,7 +4281,7 @@
             </a:r>
           </a:p>
           <a:p>
-            <a:pPr marL="0" lvl="0" indent="0" algn="l">
+            <a:pPr algn="l" marL="0" indent="0" lvl="0">
               <a:lnSpc>
                 <a:spcPts val="8120"/>
               </a:lnSpc>
@@ -4314,19 +4296,38 @@
                 </a:solidFill>
                 <a:latin typeface="Open Sans Light Italics"/>
               </a:rPr>
-              <a:t>Installez le plugin BBB depuis l’administration de votre Moodle et contactez FUN pour obtenir un accès au BBB de l’ESR ! (fun.ops@fun-mooc.fr)</a:t>
-            </a:r>
-          </a:p>
-        </p:txBody>
-      </p:sp>
-      <p:sp>
-        <p:nvSpPr>
-          <p:cNvPr id="25" name="TextBox 25"/>
-          <p:cNvSpPr txBox="1"/>
+              <a:t>Installez le plugin BBB depuis l’administration de votre Moodle et contactez FUN </a:t>
+            </a:r>
+            <a:r>
+              <a:rPr lang="en-US" sz="5800" u="sng">
+                <a:solidFill>
+                  <a:srgbClr val="2A347B"/>
+                </a:solidFill>
+                <a:latin typeface="Open Sans Light Italics"/>
+                <a:hlinkClick r:id="rId18" tooltip="https://www.fun-mooc.help/hc/fr/requests/new?ticket_form_id=9122250595357"/>
+              </a:rPr>
+              <a:t>via ce formulaire</a:t>
+            </a:r>
+            <a:r>
+              <a:rPr lang="en-US" sz="5800">
+                <a:solidFill>
+                  <a:srgbClr val="2A347B"/>
+                </a:solidFill>
+                <a:latin typeface="Open Sans Light Italics"/>
+              </a:rPr>
+              <a:t> pour obtenir un accès au BBB de l’ESR !</a:t>
+            </a:r>
+          </a:p>
+        </p:txBody>
+      </p:sp>
+      <p:sp>
+        <p:nvSpPr>
+          <p:cNvPr name="TextBox 25" id="25"/>
+          <p:cNvSpPr txBox="true"/>
           <p:nvPr/>
         </p:nvSpPr>
         <p:spPr>
-          <a:xfrm>
+          <a:xfrm rot="0">
             <a:off x="24734549" y="6861095"/>
             <a:ext cx="4892011" cy="2089151"/>
           </a:xfrm>
@@ -4335,7 +4336,7 @@
           </a:prstGeom>
         </p:spPr>
         <p:txBody>
-          <a:bodyPr lIns="0" tIns="0" rIns="0" bIns="0" rtlCol="0" anchor="t">
+          <a:bodyPr anchor="t" rtlCol="false" tIns="0" lIns="0" bIns="0" rIns="0">
             <a:spAutoFit/>
           </a:bodyPr>
           <a:lstStyle/>
@@ -4359,12 +4360,12 @@
       </p:sp>
       <p:sp>
         <p:nvSpPr>
-          <p:cNvPr id="26" name="TextBox 26"/>
-          <p:cNvSpPr txBox="1"/>
+          <p:cNvPr name="TextBox 26" id="26"/>
+          <p:cNvSpPr txBox="true"/>
           <p:nvPr/>
         </p:nvSpPr>
         <p:spPr>
-          <a:xfrm>
+          <a:xfrm rot="0">
             <a:off x="5643308" y="27680312"/>
             <a:ext cx="2261227" cy="2438455"/>
           </a:xfrm>
@@ -4373,7 +4374,7 @@
           </a:prstGeom>
         </p:spPr>
         <p:txBody>
-          <a:bodyPr lIns="0" tIns="0" rIns="0" bIns="0" rtlCol="0" anchor="t">
+          <a:bodyPr anchor="t" rtlCol="false" tIns="0" lIns="0" bIns="0" rIns="0">
             <a:spAutoFit/>
           </a:bodyPr>
           <a:lstStyle/>
@@ -4400,12 +4401,12 @@
       </p:sp>
       <p:sp>
         <p:nvSpPr>
-          <p:cNvPr id="27" name="TextBox 27"/>
-          <p:cNvSpPr txBox="1"/>
+          <p:cNvPr name="TextBox 27" id="27"/>
+          <p:cNvSpPr txBox="true"/>
           <p:nvPr/>
         </p:nvSpPr>
         <p:spPr>
-          <a:xfrm>
+          <a:xfrm rot="0">
             <a:off x="5643308" y="31846113"/>
             <a:ext cx="2261227" cy="2438455"/>
           </a:xfrm>
@@ -4414,7 +4415,7 @@
           </a:prstGeom>
         </p:spPr>
         <p:txBody>
-          <a:bodyPr lIns="0" tIns="0" rIns="0" bIns="0" rtlCol="0" anchor="t">
+          <a:bodyPr anchor="t" rtlCol="false" tIns="0" lIns="0" bIns="0" rIns="0">
             <a:spAutoFit/>
           </a:bodyPr>
           <a:lstStyle/>
@@ -4441,21 +4442,21 @@
       </p:sp>
       <p:sp>
         <p:nvSpPr>
-          <p:cNvPr id="28" name="TextBox 28"/>
-          <p:cNvSpPr txBox="1"/>
+          <p:cNvPr name="TextBox 28" id="28"/>
+          <p:cNvSpPr txBox="true"/>
           <p:nvPr/>
         </p:nvSpPr>
         <p:spPr>
-          <a:xfrm>
-            <a:off x="9524022" y="32124588"/>
-            <a:ext cx="21875203" cy="2033905"/>
+          <a:xfrm rot="0">
+            <a:off x="9212289" y="23813642"/>
+            <a:ext cx="22670407" cy="2033905"/>
           </a:xfrm>
           <a:prstGeom prst="rect">
             <a:avLst/>
           </a:prstGeom>
         </p:spPr>
         <p:txBody>
-          <a:bodyPr lIns="0" tIns="0" rIns="0" bIns="0" rtlCol="0" anchor="t">
+          <a:bodyPr anchor="t" rtlCol="false" tIns="0" lIns="0" bIns="0" rIns="0">
             <a:spAutoFit/>
           </a:bodyPr>
           <a:lstStyle/>
@@ -4494,7 +4495,7 @@
             </a:r>
           </a:p>
           <a:p>
-            <a:pPr marL="0" lvl="0" indent="0" algn="l">
+            <a:pPr algn="l" marL="0" indent="0" lvl="0">
               <a:lnSpc>
                 <a:spcPts val="8120"/>
               </a:lnSpc>
@@ -4509,20 +4510,48 @@
                 </a:solidFill>
                 <a:latin typeface="Open Sans Light Italics"/>
               </a:rPr>
-              <a:t>Contactez FUN pour obtenir un passeport LTI ! (fun.ops@fun-mooc.fr)</a:t>
-            </a:r>
-          </a:p>
-        </p:txBody>
-      </p:sp>
-      <p:sp>
-        <p:nvSpPr>
-          <p:cNvPr id="29" name="TextBox 29"/>
-          <p:cNvSpPr txBox="1"/>
+              <a:t>Contactez FUN </a:t>
+            </a:r>
+            <a:r>
+              <a:rPr lang="en-US" sz="5800" u="sng">
+                <a:solidFill>
+                  <a:srgbClr val="2A347B"/>
+                </a:solidFill>
+                <a:latin typeface="Open Sans Light Italics"/>
+                <a:hlinkClick r:id="rId19" tooltip="https://www.fun-mooc.help/hc/fr/requests/new?ticket_form_id=9122250595357"/>
+              </a:rPr>
+              <a:t>via ce formulaire</a:t>
+            </a:r>
+            <a:r>
+              <a:rPr lang="en-US" sz="5800">
+                <a:solidFill>
+                  <a:srgbClr val="2A347B"/>
+                </a:solidFill>
+                <a:latin typeface="Open Sans Light"/>
+              </a:rPr>
+              <a:t> </a:t>
+            </a:r>
+            <a:r>
+              <a:rPr lang="en-US" sz="5800">
+                <a:solidFill>
+                  <a:srgbClr val="2A347B"/>
+                </a:solidFill>
+                <a:latin typeface="Open Sans Light Italics"/>
+              </a:rPr>
+              <a:t>pour obtenir un passeport LTI !</a:t>
+            </a:r>
+          </a:p>
+        </p:txBody>
+      </p:sp>
+      <p:sp>
+        <p:nvSpPr>
+          <p:cNvPr name="TextBox 29" id="29"/>
+          <p:cNvSpPr txBox="true"/>
           <p:nvPr/>
         </p:nvSpPr>
         <p:spPr>
-          <a:xfrm>
-            <a:off x="9524022" y="35772663"/>
+          <a:xfrm rot="0">
+            <a:off x="9212289" y="35772663"/>
             <a:ext cx="21115024" cy="3062605"/>
           </a:xfrm>
           <a:prstGeom prst="rect">
@@ -4530,7 +4559,7 @@
           </a:prstGeom>
         </p:spPr>
         <p:txBody>
-          <a:bodyPr lIns="0" tIns="0" rIns="0" bIns="0" rtlCol="0" anchor="t">
+          <a:bodyPr anchor="t" rtlCol="false" tIns="0" lIns="0" bIns="0" rIns="0">
             <a:spAutoFit/>
           </a:bodyPr>
           <a:lstStyle/>
@@ -4550,17 +4579,18 @@
               <a:t>Par le portail </a:t>
             </a:r>
             <a:r>
-              <a:rPr lang="en-US" sz="5800">
+              <a:rPr lang="en-US" sz="5800" u="sng">
                 <a:solidFill>
                   <a:srgbClr val="2A347B"/>
                 </a:solidFill>
                 <a:latin typeface="Open Sans Bold"/>
+                <a:hlinkClick r:id="rId20" tooltip="https://classe-virtuelle.numerique-esr.fr"/>
               </a:rPr>
-              <a:t>https://marsha.education</a:t>
-            </a:r>
-          </a:p>
-          <a:p>
-            <a:pPr marL="0" lvl="0" indent="0">
+              <a:t>https://classe-virtuelle.numerique-esr.fr</a:t>
+            </a:r>
+          </a:p>
+          <a:p>
+            <a:pPr marL="0" indent="0" lvl="0">
               <a:lnSpc>
                 <a:spcPts val="8120"/>
               </a:lnSpc>
@@ -4575,19 +4605,28 @@
                 </a:solidFill>
                 <a:latin typeface="Open Sans Light Italics"/>
               </a:rPr>
-              <a:t>Rien à faire: Les enseignants peuvent se connecter via Shibboleth pour créer et diffuser une classe virtuelle !</a:t>
-            </a:r>
-          </a:p>
-        </p:txBody>
-      </p:sp>
-      <p:sp>
-        <p:nvSpPr>
-          <p:cNvPr id="30" name="TextBox 30"/>
-          <p:cNvSpPr txBox="1"/>
+              <a:t>Rien à faire: Les enseignants peuvent se connecter </a:t>
+            </a:r>
+            <a:r>
+              <a:rPr lang="en-US" sz="5800">
+                <a:solidFill>
+                  <a:srgbClr val="2A347B"/>
+                </a:solidFill>
+                <a:latin typeface="Open Sans Light Italics"/>
+              </a:rPr>
+              <a:t>via Shibboleth pour créer et diffuser une classe virtuelle !</a:t>
+            </a:r>
+          </a:p>
+        </p:txBody>
+      </p:sp>
+      <p:sp>
+        <p:nvSpPr>
+          <p:cNvPr name="TextBox 30" id="30"/>
+          <p:cNvSpPr txBox="true"/>
           <p:nvPr/>
         </p:nvSpPr>
         <p:spPr>
-          <a:xfrm>
+          <a:xfrm rot="0">
             <a:off x="4519590" y="6861095"/>
             <a:ext cx="6918585" cy="2089151"/>
           </a:xfrm>
@@ -4596,7 +4635,7 @@
           </a:prstGeom>
         </p:spPr>
         <p:txBody>
-          <a:bodyPr lIns="0" tIns="0" rIns="0" bIns="0" rtlCol="0" anchor="t">
+          <a:bodyPr anchor="t" rtlCol="false" tIns="0" lIns="0" bIns="0" rIns="0">
             <a:spAutoFit/>
           </a:bodyPr>
           <a:lstStyle/>
@@ -4629,12 +4668,12 @@
       </p:sp>
       <p:sp>
         <p:nvSpPr>
-          <p:cNvPr id="31" name="TextBox 31"/>
-          <p:cNvSpPr txBox="1"/>
+          <p:cNvPr name="TextBox 31" id="31"/>
+          <p:cNvSpPr txBox="true"/>
           <p:nvPr/>
         </p:nvSpPr>
         <p:spPr>
-          <a:xfrm>
+          <a:xfrm rot="0">
             <a:off x="11885851" y="6853045"/>
             <a:ext cx="6268639" cy="2794001"/>
           </a:xfrm>
@@ -4643,7 +4682,7 @@
           </a:prstGeom>
         </p:spPr>
         <p:txBody>
-          <a:bodyPr lIns="0" tIns="0" rIns="0" bIns="0" rtlCol="0" anchor="t">
+          <a:bodyPr anchor="t" rtlCol="false" tIns="0" lIns="0" bIns="0" rIns="0">
             <a:spAutoFit/>
           </a:bodyPr>
           <a:lstStyle/>
@@ -4685,12 +4724,12 @@
       </p:sp>
       <p:sp>
         <p:nvSpPr>
-          <p:cNvPr id="32" name="TextBox 32"/>
-          <p:cNvSpPr txBox="1"/>
+          <p:cNvPr name="TextBox 32" id="32"/>
+          <p:cNvSpPr txBox="true"/>
           <p:nvPr/>
         </p:nvSpPr>
         <p:spPr>
-          <a:xfrm>
+          <a:xfrm rot="0">
             <a:off x="18602164" y="6853045"/>
             <a:ext cx="5684832" cy="2089151"/>
           </a:xfrm>
@@ -4699,7 +4738,7 @@
           </a:prstGeom>
         </p:spPr>
         <p:txBody>
-          <a:bodyPr lIns="0" tIns="0" rIns="0" bIns="0" rtlCol="0" anchor="t">
+          <a:bodyPr anchor="t" rtlCol="false" tIns="0" lIns="0" bIns="0" rIns="0">
             <a:spAutoFit/>
           </a:bodyPr>
           <a:lstStyle/>
@@ -4732,8 +4771,8 @@
       </p:sp>
       <p:sp>
         <p:nvSpPr>
-          <p:cNvPr id="33" name="TextBox 33"/>
-          <p:cNvSpPr txBox="1"/>
+          <p:cNvPr name="TextBox 33" id="33"/>
+          <p:cNvSpPr txBox="true"/>
           <p:nvPr/>
         </p:nvSpPr>
         <p:spPr>
@@ -4746,7 +4785,7 @@
           </a:prstGeom>
         </p:spPr>
         <p:txBody>
-          <a:bodyPr lIns="0" tIns="0" rIns="0" bIns="0" rtlCol="0" anchor="t">
+          <a:bodyPr anchor="t" rtlCol="false" tIns="0" lIns="0" bIns="0" rIns="0">
             <a:spAutoFit/>
           </a:bodyPr>
           <a:lstStyle/>
@@ -4770,12 +4809,12 @@
       </p:sp>
       <p:sp>
         <p:nvSpPr>
-          <p:cNvPr id="34" name="Freeform 34"/>
+          <p:cNvPr name="Freeform 34" id="34"/>
           <p:cNvSpPr/>
           <p:nvPr/>
         </p:nvSpPr>
         <p:spPr>
-          <a:xfrm>
+          <a:xfrm flipH="false" flipV="false" rot="0">
             <a:off x="27321027" y="41252152"/>
             <a:ext cx="1789206" cy="1801157"/>
           </a:xfrm>
@@ -4784,9 +4823,9 @@
             <a:gdLst/>
             <a:ahLst/>
             <a:cxnLst/>
-            <a:rect l="l" t="t" r="r" b="b"/>
+            <a:rect r="r" b="b" t="t" l="l"/>
             <a:pathLst>
-              <a:path w="1789206" h="1801157">
+              <a:path h="1801157" w="1789206">
                 <a:moveTo>
                   <a:pt x="0" y="0"/>
                 </a:moveTo>
@@ -4807,9 +4846,9 @@
             </a:pathLst>
           </a:custGeom>
           <a:blipFill>
-            <a:blip r:embed="rId17"/>
+            <a:blip r:embed="rId21"/>
             <a:stretch>
-              <a:fillRect/>
+              <a:fillRect l="0" t="0" r="0" b="0"/>
             </a:stretch>
           </a:blipFill>
         </p:spPr>

</xml_diff>